<commit_message>
Use xaringan builder to add partial slides
</commit_message>
<xml_diff>
--- a/Presentation/Slides-day-2.pptx
+++ b/Presentation/Slides-day-2.pptx
@@ -66,6 +66,7 @@
     <p:sldId id="314" r:id="rId64"/>
     <p:sldId id="315" r:id="rId65"/>
     <p:sldId id="316" r:id="rId66"/>
+    <p:sldId id="317" r:id="rId67"/>
   </p:sldIdLst>
   <p:sldSz cx="12192000" cy="6858000"/>
   <p:notesSz cx="6858000" cy="9144000"/>
@@ -6327,6 +6328,57 @@
 </p:sld>
 </file>
 
+<file path=ppt/slides/slide62.xml><?xml version="1.0" encoding="utf-8"?>
+<p:sld xmlns:a="http://schemas.openxmlformats.org/drawingml/2006/main" xmlns:r="http://schemas.openxmlformats.org/officeDocument/2006/relationships" xmlns:p="http://schemas.openxmlformats.org/presentationml/2006/main">
+  <p:cSld>
+    <p:spTree>
+      <p:nvGrpSpPr>
+        <p:cNvPr id="1" name=""/>
+        <p:cNvGrpSpPr/>
+        <p:nvPr/>
+      </p:nvGrpSpPr>
+      <p:grpSpPr>
+        <a:xfrm>
+          <a:off x="0" y="0"/>
+          <a:ext cx="0" cy="0"/>
+          <a:chOff x="0" y="0"/>
+          <a:chExt cx="0" cy="0"/>
+        </a:xfrm>
+      </p:grpSpPr>
+      <p:pic xmlns:a="http://schemas.openxmlformats.org/drawingml/2006/main" xmlns:r="http://schemas.openxmlformats.org/officeDocument/2006/relationships" xmlns:p="http://schemas.openxmlformats.org/presentationml/2006/main">
+        <p:nvPicPr>
+          <p:cNvPr id="2" name="" descr=""/>
+          <p:cNvPicPr>
+            <a:picLocks noGrp="1"/>
+          </p:cNvPicPr>
+          <p:nvPr>
+            <p:ph/>
+          </p:nvPr>
+        </p:nvPicPr>
+        <p:blipFill>
+          <a:blip cstate="print" r:embed="rId2"/>
+          <a:stretch>
+            <a:fillRect/>
+          </a:stretch>
+        </p:blipFill>
+        <p:spPr>
+          <a:xfrm>
+            <a:off x="0" y="0"/>
+            <a:ext cx="12192000" cy="6858000"/>
+          </a:xfrm>
+          <a:prstGeom prst="rect">
+            <a:avLst/>
+          </a:prstGeom>
+        </p:spPr>
+      </p:pic>
+    </p:spTree>
+  </p:cSld>
+  <p:clrMapOvr>
+    <a:masterClrMapping/>
+  </p:clrMapOvr>
+</p:sld>
+</file>
+
 <file path=ppt/slides/slide7.xml><?xml version="1.0" encoding="utf-8"?>
 <p:sld xmlns:a="http://schemas.openxmlformats.org/drawingml/2006/main" xmlns:r="http://schemas.openxmlformats.org/officeDocument/2006/relationships" xmlns:p="http://schemas.openxmlformats.org/presentationml/2006/main">
   <p:cSld>

</xml_diff>